<commit_message>
rearrange ext folder and update README therin
</commit_message>
<xml_diff>
--- a/ext/fig2.pptx
+++ b/ext/fig2.pptx
@@ -263,7 +263,7 @@
           <a:p>
             <a:fld id="{2DA35BCE-54A8-C844-B7DB-32ECD7200E70}" type="datetimeFigureOut">
               <a:rPr lang="en-US" smtClean="0"/>
-              <a:t>9/2/20</a:t>
+              <a:t>9/7/20</a:t>
             </a:fld>
             <a:endParaRPr lang="en-US"/>
           </a:p>
@@ -461,7 +461,7 @@
           <a:p>
             <a:fld id="{2DA35BCE-54A8-C844-B7DB-32ECD7200E70}" type="datetimeFigureOut">
               <a:rPr lang="en-US" smtClean="0"/>
-              <a:t>9/2/20</a:t>
+              <a:t>9/7/20</a:t>
             </a:fld>
             <a:endParaRPr lang="en-US"/>
           </a:p>
@@ -669,7 +669,7 @@
           <a:p>
             <a:fld id="{2DA35BCE-54A8-C844-B7DB-32ECD7200E70}" type="datetimeFigureOut">
               <a:rPr lang="en-US" smtClean="0"/>
-              <a:t>9/2/20</a:t>
+              <a:t>9/7/20</a:t>
             </a:fld>
             <a:endParaRPr lang="en-US"/>
           </a:p>
@@ -867,7 +867,7 @@
           <a:p>
             <a:fld id="{2DA35BCE-54A8-C844-B7DB-32ECD7200E70}" type="datetimeFigureOut">
               <a:rPr lang="en-US" smtClean="0"/>
-              <a:t>9/2/20</a:t>
+              <a:t>9/7/20</a:t>
             </a:fld>
             <a:endParaRPr lang="en-US"/>
           </a:p>
@@ -1142,7 +1142,7 @@
           <a:p>
             <a:fld id="{2DA35BCE-54A8-C844-B7DB-32ECD7200E70}" type="datetimeFigureOut">
               <a:rPr lang="en-US" smtClean="0"/>
-              <a:t>9/2/20</a:t>
+              <a:t>9/7/20</a:t>
             </a:fld>
             <a:endParaRPr lang="en-US"/>
           </a:p>
@@ -1407,7 +1407,7 @@
           <a:p>
             <a:fld id="{2DA35BCE-54A8-C844-B7DB-32ECD7200E70}" type="datetimeFigureOut">
               <a:rPr lang="en-US" smtClean="0"/>
-              <a:t>9/2/20</a:t>
+              <a:t>9/7/20</a:t>
             </a:fld>
             <a:endParaRPr lang="en-US"/>
           </a:p>
@@ -1819,7 +1819,7 @@
           <a:p>
             <a:fld id="{2DA35BCE-54A8-C844-B7DB-32ECD7200E70}" type="datetimeFigureOut">
               <a:rPr lang="en-US" smtClean="0"/>
-              <a:t>9/2/20</a:t>
+              <a:t>9/7/20</a:t>
             </a:fld>
             <a:endParaRPr lang="en-US"/>
           </a:p>
@@ -1960,7 +1960,7 @@
           <a:p>
             <a:fld id="{2DA35BCE-54A8-C844-B7DB-32ECD7200E70}" type="datetimeFigureOut">
               <a:rPr lang="en-US" smtClean="0"/>
-              <a:t>9/2/20</a:t>
+              <a:t>9/7/20</a:t>
             </a:fld>
             <a:endParaRPr lang="en-US"/>
           </a:p>
@@ -2073,7 +2073,7 @@
           <a:p>
             <a:fld id="{2DA35BCE-54A8-C844-B7DB-32ECD7200E70}" type="datetimeFigureOut">
               <a:rPr lang="en-US" smtClean="0"/>
-              <a:t>9/2/20</a:t>
+              <a:t>9/7/20</a:t>
             </a:fld>
             <a:endParaRPr lang="en-US"/>
           </a:p>
@@ -2384,7 +2384,7 @@
           <a:p>
             <a:fld id="{2DA35BCE-54A8-C844-B7DB-32ECD7200E70}" type="datetimeFigureOut">
               <a:rPr lang="en-US" smtClean="0"/>
-              <a:t>9/2/20</a:t>
+              <a:t>9/7/20</a:t>
             </a:fld>
             <a:endParaRPr lang="en-US"/>
           </a:p>
@@ -2672,7 +2672,7 @@
           <a:p>
             <a:fld id="{2DA35BCE-54A8-C844-B7DB-32ECD7200E70}" type="datetimeFigureOut">
               <a:rPr lang="en-US" smtClean="0"/>
-              <a:t>9/2/20</a:t>
+              <a:t>9/7/20</a:t>
             </a:fld>
             <a:endParaRPr lang="en-US"/>
           </a:p>
@@ -2913,7 +2913,7 @@
           <a:p>
             <a:fld id="{2DA35BCE-54A8-C844-B7DB-32ECD7200E70}" type="datetimeFigureOut">
               <a:rPr lang="en-US" smtClean="0"/>
-              <a:t>9/2/20</a:t>
+              <a:t>9/7/20</a:t>
             </a:fld>
             <a:endParaRPr lang="en-US"/>
           </a:p>
@@ -3875,8 +3875,8 @@
         </p:nvSpPr>
         <p:spPr>
           <a:xfrm>
-            <a:off x="563510" y="5441229"/>
-            <a:ext cx="9535988" cy="646331"/>
+            <a:off x="711835" y="4662601"/>
+            <a:ext cx="9535988" cy="1200329"/>
           </a:xfrm>
           <a:prstGeom prst="rect">
             <a:avLst/>
@@ -3890,8 +3890,16 @@
           <a:lstStyle/>
           <a:p>
             <a:r>
-              <a:rPr lang="en-US" dirty="0"/>
-              <a:t>b) Differential expression by SES predictors in the rest of the genome. This Venn diagram indicates which SES indicators drive DE among the </a:t>
+              <a:rPr lang="en-US" sz="1200" dirty="0"/>
+              <a:t>b) Pathway analysis on clusters of co-expressed genes. We ran pathway analyses on the 29 downregulated genes with SES4 (negative effect direction) and the 8 genes simultaneously downregulated for SES4 and income. Significance was determined via GO-terms in WEBGESTALT. In particular, we constructed networks by means of the (default) network expansion method based on the top ranking 10 neighbors. We addressed multiple testing corrections using </a:t>
+            </a:r>
+            <a:r>
+              <a:rPr lang="en-US" sz="1200" dirty="0" err="1"/>
+              <a:t>Benjamini</a:t>
+            </a:r>
+            <a:r>
+              <a:rPr lang="en-US" sz="1200" dirty="0"/>
+              <a:t> &amp; Hochberg FDR. A significance threshold of 0.05 after correction for multiple testing was applied. (a) One cluster of downregulated genes with SES4 and (b) one cluster of genes downregulated with SES4 and income were enriched for GO terms; representative pathways are mentioned next to the cluster names (See appendix for full details). </a:t>
             </a:r>
           </a:p>
         </p:txBody>

</xml_diff>